<commit_message>
Reihenfolge von Folien angepasst
</commit_message>
<xml_diff>
--- a/docs/Praesentation/Fachaustausch_Entwurf.pptx
+++ b/docs/Praesentation/Fachaustausch_Entwurf.pptx
@@ -46,7 +46,7 @@
         <p:spPr>
           <a:xfrm>
             <a:off x="504000" y="561600"/>
-            <a:ext cx="9069120" cy="274680"/>
+            <a:ext cx="9068760" cy="274680"/>
           </a:xfrm>
           <a:prstGeom prst="rect">
             <a:avLst/>
@@ -81,7 +81,7 @@
               </a:rPr>
               <a:t>Click to edit the title text format</a:t>
             </a:r>
-            <a:endParaRPr b="0" lang="en-US" sz="1800" strike="noStrike" u="none">
+            <a:endParaRPr b="0" lang="de-DE" sz="1800" strike="noStrike" u="none">
               <a:solidFill>
                 <a:srgbClr val="000000"/>
               </a:solidFill>
@@ -105,7 +105,7 @@
         <p:spPr>
           <a:xfrm>
             <a:off x="3447360" y="5165280"/>
-            <a:ext cx="3192480" cy="388080"/>
+            <a:ext cx="3192120" cy="387720"/>
           </a:xfrm>
           <a:prstGeom prst="rect">
             <a:avLst/>
@@ -157,9 +157,9 @@
                 <a:uFillTx/>
                 <a:latin typeface="Times New Roman"/>
               </a:rPr>
-              <a:t> </a:t>
-            </a:r>
-            <a:endParaRPr b="0" lang="en-US" sz="1400" strike="noStrike" u="none">
+              <a:t>&lt;Fußzeile&gt;</a:t>
+            </a:r>
+            <a:endParaRPr b="0" lang="de-DE" sz="1400" strike="noStrike" u="none">
               <a:solidFill>
                 <a:srgbClr val="000000"/>
               </a:solidFill>
@@ -183,7 +183,7 @@
         <p:spPr>
           <a:xfrm>
             <a:off x="7227360" y="5165280"/>
-            <a:ext cx="2345760" cy="388080"/>
+            <a:ext cx="2345400" cy="387720"/>
           </a:xfrm>
           <a:prstGeom prst="rect">
             <a:avLst/>
@@ -226,7 +226,7 @@
                 <a:tab algn="l" pos="0"/>
               </a:tabLst>
             </a:pPr>
-            <a:fld id="{0DDDFF27-57B0-4C01-9B64-5825740295E7}" type="slidenum">
+            <a:fld id="{FA2EE5FD-A31D-4EBC-9119-7B7331579C6E}" type="slidenum">
               <a:rPr b="0" lang="de-DE" sz="1400" strike="noStrike" u="none">
                 <a:solidFill>
                   <a:srgbClr val="000000"/>
@@ -235,9 +235,9 @@
                 <a:uFillTx/>
                 <a:latin typeface="Times New Roman"/>
               </a:rPr>
-              <a:t>2</a:t>
+              <a:t>&lt;Foliennummer&gt;</a:t>
             </a:fld>
-            <a:endParaRPr b="0" lang="en-US" sz="1400" strike="noStrike" u="none">
+            <a:endParaRPr b="0" lang="de-DE" sz="1400" strike="noStrike" u="none">
               <a:solidFill>
                 <a:srgbClr val="000000"/>
               </a:solidFill>
@@ -261,7 +261,7 @@
         <p:spPr>
           <a:xfrm>
             <a:off x="504000" y="5165280"/>
-            <a:ext cx="2345760" cy="388080"/>
+            <a:ext cx="2345400" cy="387720"/>
           </a:xfrm>
           <a:prstGeom prst="rect">
             <a:avLst/>
@@ -313,9 +313,9 @@
                 <a:uFillTx/>
                 <a:latin typeface="Times New Roman"/>
               </a:rPr>
-              <a:t> </a:t>
-            </a:r>
-            <a:endParaRPr b="0" lang="en-US" sz="1400" strike="noStrike" u="none">
+              <a:t>&lt;Datum/Uhrzeit&gt;</a:t>
+            </a:r>
+            <a:endParaRPr b="0" lang="de-DE" sz="1400" strike="noStrike" u="none">
               <a:solidFill>
                 <a:srgbClr val="000000"/>
               </a:solidFill>
@@ -339,7 +339,7 @@
         <p:spPr>
           <a:xfrm>
             <a:off x="504000" y="1326600"/>
-            <a:ext cx="9069840" cy="3286440"/>
+            <a:ext cx="9069480" cy="3286080"/>
           </a:xfrm>
           <a:prstGeom prst="rect">
             <a:avLst/>
@@ -379,7 +379,7 @@
               </a:rPr>
               <a:t>Click to edit the outline text format</a:t>
             </a:r>
-            <a:endParaRPr b="0" lang="en-US" sz="3200" strike="noStrike" u="none">
+            <a:endParaRPr b="0" lang="de-DE" sz="3200" strike="noStrike" u="none">
               <a:solidFill>
                 <a:srgbClr val="000000"/>
               </a:solidFill>
@@ -414,7 +414,7 @@
               </a:rPr>
               <a:t>Second Outline Level</a:t>
             </a:r>
-            <a:endParaRPr b="0" lang="en-US" sz="2800" strike="noStrike" u="none">
+            <a:endParaRPr b="0" lang="de-DE" sz="2800" strike="noStrike" u="none">
               <a:solidFill>
                 <a:srgbClr val="000000"/>
               </a:solidFill>
@@ -449,7 +449,7 @@
               </a:rPr>
               <a:t>Third Outline Level</a:t>
             </a:r>
-            <a:endParaRPr b="0" lang="en-US" sz="2400" strike="noStrike" u="none">
+            <a:endParaRPr b="0" lang="de-DE" sz="2400" strike="noStrike" u="none">
               <a:solidFill>
                 <a:srgbClr val="000000"/>
               </a:solidFill>
@@ -484,7 +484,7 @@
               </a:rPr>
               <a:t>Fourth Outline Level</a:t>
             </a:r>
-            <a:endParaRPr b="0" lang="en-US" sz="2000" strike="noStrike" u="none">
+            <a:endParaRPr b="0" lang="de-DE" sz="2000" strike="noStrike" u="none">
               <a:solidFill>
                 <a:srgbClr val="000000"/>
               </a:solidFill>
@@ -519,7 +519,7 @@
               </a:rPr>
               <a:t>Fifth Outline Level</a:t>
             </a:r>
-            <a:endParaRPr b="0" lang="en-US" sz="2000" strike="noStrike" u="none">
+            <a:endParaRPr b="0" lang="de-DE" sz="2000" strike="noStrike" u="none">
               <a:solidFill>
                 <a:srgbClr val="000000"/>
               </a:solidFill>
@@ -554,7 +554,7 @@
               </a:rPr>
               <a:t>Sixth Outline Level</a:t>
             </a:r>
-            <a:endParaRPr b="0" lang="en-US" sz="2000" strike="noStrike" u="none">
+            <a:endParaRPr b="0" lang="de-DE" sz="2000" strike="noStrike" u="none">
               <a:solidFill>
                 <a:srgbClr val="000000"/>
               </a:solidFill>
@@ -589,7 +589,7 @@
               </a:rPr>
               <a:t>Seventh Outline Level</a:t>
             </a:r>
-            <a:endParaRPr b="0" lang="en-US" sz="2000" strike="noStrike" u="none">
+            <a:endParaRPr b="0" lang="de-DE" sz="2000" strike="noStrike" u="none">
               <a:solidFill>
                 <a:srgbClr val="000000"/>
               </a:solidFill>
@@ -635,7 +635,7 @@
         <p:spPr>
           <a:xfrm>
             <a:off x="504000" y="561600"/>
-            <a:ext cx="9069120" cy="274680"/>
+            <a:ext cx="9068760" cy="274680"/>
           </a:xfrm>
           <a:prstGeom prst="rect">
             <a:avLst/>
@@ -670,7 +670,7 @@
               </a:rPr>
               <a:t>Click to edit the title text format</a:t>
             </a:r>
-            <a:endParaRPr b="0" lang="en-US" sz="1800" strike="noStrike" u="none">
+            <a:endParaRPr b="0" lang="de-DE" sz="1800" strike="noStrike" u="none">
               <a:solidFill>
                 <a:srgbClr val="000000"/>
               </a:solidFill>
@@ -694,7 +694,7 @@
         <p:spPr>
           <a:xfrm>
             <a:off x="504000" y="1326600"/>
-            <a:ext cx="9069120" cy="3285720"/>
+            <a:ext cx="9068760" cy="3285360"/>
           </a:xfrm>
           <a:prstGeom prst="rect">
             <a:avLst/>
@@ -734,7 +734,7 @@
               </a:rPr>
               <a:t>Click to edit the outline text format</a:t>
             </a:r>
-            <a:endParaRPr b="0" lang="en-US" sz="1800" strike="noStrike" u="none">
+            <a:endParaRPr b="0" lang="de-DE" sz="1800" strike="noStrike" u="none">
               <a:solidFill>
                 <a:srgbClr val="000000"/>
               </a:solidFill>
@@ -769,7 +769,7 @@
               </a:rPr>
               <a:t>Second Outline Level</a:t>
             </a:r>
-            <a:endParaRPr b="0" lang="en-US" sz="1800" strike="noStrike" u="none">
+            <a:endParaRPr b="0" lang="de-DE" sz="1800" strike="noStrike" u="none">
               <a:solidFill>
                 <a:srgbClr val="000000"/>
               </a:solidFill>
@@ -804,7 +804,7 @@
               </a:rPr>
               <a:t>Third Outline Level</a:t>
             </a:r>
-            <a:endParaRPr b="0" lang="en-US" sz="1800" strike="noStrike" u="none">
+            <a:endParaRPr b="0" lang="de-DE" sz="1800" strike="noStrike" u="none">
               <a:solidFill>
                 <a:srgbClr val="000000"/>
               </a:solidFill>
@@ -839,7 +839,7 @@
               </a:rPr>
               <a:t>Fourth Outline Level</a:t>
             </a:r>
-            <a:endParaRPr b="0" lang="en-US" sz="1800" strike="noStrike" u="none">
+            <a:endParaRPr b="0" lang="de-DE" sz="1800" strike="noStrike" u="none">
               <a:solidFill>
                 <a:srgbClr val="000000"/>
               </a:solidFill>
@@ -874,7 +874,7 @@
               </a:rPr>
               <a:t>Fifth Outline Level</a:t>
             </a:r>
-            <a:endParaRPr b="0" lang="en-US" sz="1800" strike="noStrike" u="none">
+            <a:endParaRPr b="0" lang="de-DE" sz="1800" strike="noStrike" u="none">
               <a:solidFill>
                 <a:srgbClr val="000000"/>
               </a:solidFill>
@@ -909,7 +909,7 @@
               </a:rPr>
               <a:t>Sixth Outline Level</a:t>
             </a:r>
-            <a:endParaRPr b="0" lang="en-US" sz="1800" strike="noStrike" u="none">
+            <a:endParaRPr b="0" lang="de-DE" sz="1800" strike="noStrike" u="none">
               <a:solidFill>
                 <a:srgbClr val="000000"/>
               </a:solidFill>
@@ -944,7 +944,7 @@
               </a:rPr>
               <a:t>Seventh Outline Level</a:t>
             </a:r>
-            <a:endParaRPr b="0" lang="en-US" sz="1800" strike="noStrike" u="none">
+            <a:endParaRPr b="0" lang="de-DE" sz="1800" strike="noStrike" u="none">
               <a:solidFill>
                 <a:srgbClr val="000000"/>
               </a:solidFill>
@@ -968,7 +968,7 @@
         <p:spPr>
           <a:xfrm>
             <a:off x="3447360" y="5165280"/>
-            <a:ext cx="3192480" cy="388080"/>
+            <a:ext cx="3192120" cy="387720"/>
           </a:xfrm>
           <a:prstGeom prst="rect">
             <a:avLst/>
@@ -1020,9 +1020,9 @@
                 <a:uFillTx/>
                 <a:latin typeface="Times New Roman"/>
               </a:rPr>
-              <a:t>&lt;footer&gt;</a:t>
-            </a:r>
-            <a:endParaRPr b="0" lang="en-US" sz="1400" strike="noStrike" u="none">
+              <a:t>&lt;Fußzeile&gt;</a:t>
+            </a:r>
+            <a:endParaRPr b="0" lang="de-DE" sz="1400" strike="noStrike" u="none">
               <a:solidFill>
                 <a:srgbClr val="000000"/>
               </a:solidFill>
@@ -1046,7 +1046,7 @@
         <p:spPr>
           <a:xfrm>
             <a:off x="7227360" y="5165280"/>
-            <a:ext cx="2345760" cy="388080"/>
+            <a:ext cx="2345400" cy="387720"/>
           </a:xfrm>
           <a:prstGeom prst="rect">
             <a:avLst/>
@@ -1089,7 +1089,7 @@
                 <a:tab algn="l" pos="0"/>
               </a:tabLst>
             </a:pPr>
-            <a:fld id="{DD867B67-C862-474E-B349-F5C34D2C29D6}" type="slidenum">
+            <a:fld id="{6F61876B-483F-4138-AC72-91556CF1318A}" type="slidenum">
               <a:rPr b="0" lang="de-DE" sz="1400" strike="noStrike" u="none">
                 <a:solidFill>
                   <a:srgbClr val="000000"/>
@@ -1098,9 +1098,9 @@
                 <a:uFillTx/>
                 <a:latin typeface="Times New Roman"/>
               </a:rPr>
-              <a:t>&lt;number&gt;</a:t>
+              <a:t>&lt;Foliennummer&gt;</a:t>
             </a:fld>
-            <a:endParaRPr b="0" lang="en-US" sz="1400" strike="noStrike" u="none">
+            <a:endParaRPr b="0" lang="de-DE" sz="1400" strike="noStrike" u="none">
               <a:solidFill>
                 <a:srgbClr val="000000"/>
               </a:solidFill>
@@ -1124,7 +1124,7 @@
         <p:spPr>
           <a:xfrm>
             <a:off x="504000" y="5165280"/>
-            <a:ext cx="2345760" cy="388080"/>
+            <a:ext cx="2345400" cy="387720"/>
           </a:xfrm>
           <a:prstGeom prst="rect">
             <a:avLst/>
@@ -1176,9 +1176,9 @@
                 <a:uFillTx/>
                 <a:latin typeface="Times New Roman"/>
               </a:rPr>
-              <a:t>&lt;date/time&gt;</a:t>
-            </a:r>
-            <a:endParaRPr b="0" lang="en-US" sz="1400" strike="noStrike" u="none">
+              <a:t>&lt;Datum/Uhrzeit&gt;</a:t>
+            </a:r>
+            <a:endParaRPr b="0" lang="de-DE" sz="1400" strike="noStrike" u="none">
               <a:solidFill>
                 <a:srgbClr val="000000"/>
               </a:solidFill>
@@ -1250,8 +1250,8 @@
         </p:nvSpPr>
         <p:spPr>
           <a:xfrm>
-            <a:off x="504000" y="223560"/>
-            <a:ext cx="9069120" cy="948960"/>
+            <a:off x="504000" y="223200"/>
+            <a:ext cx="9068760" cy="949320"/>
           </a:xfrm>
           <a:prstGeom prst="rect">
             <a:avLst/>
@@ -1286,7 +1286,7 @@
               </a:rPr>
               <a:t>Entwurfs-Erstellung</a:t>
             </a:r>
-            <a:endParaRPr b="0" lang="en-US" sz="4400" strike="noStrike" u="none">
+            <a:endParaRPr b="0" lang="de-DE" sz="4400" strike="noStrike" u="none">
               <a:solidFill>
                 <a:srgbClr val="000000"/>
               </a:solidFill>
@@ -1309,8 +1309,8 @@
         </p:nvSpPr>
         <p:spPr>
           <a:xfrm>
-            <a:off x="685800" y="3429000"/>
-            <a:ext cx="5433480" cy="2057400"/>
+            <a:off x="685800" y="3428640"/>
+            <a:ext cx="5433120" cy="2057760"/>
           </a:xfrm>
           <a:prstGeom prst="rect">
             <a:avLst/>
@@ -1346,7 +1346,7 @@
               </a:rPr>
               <a:t>Allgemein im Weekly über Umsetzung reden</a:t>
             </a:r>
-            <a:endParaRPr b="0" lang="en-US" sz="2400" strike="noStrike" u="none">
+            <a:endParaRPr b="0" lang="de-DE" sz="2400" strike="noStrike" u="none">
               <a:solidFill>
                 <a:srgbClr val="000000"/>
               </a:solidFill>
@@ -1378,7 +1378,7 @@
               </a:rPr>
               <a:t>Meistens haben alle ähnliche Vorstellungen, wie Umsetzung passiert</a:t>
             </a:r>
-            <a:endParaRPr b="0" lang="en-US" sz="2400" strike="noStrike" u="none">
+            <a:endParaRPr b="0" lang="de-DE" sz="2400" strike="noStrike" u="none">
               <a:solidFill>
                 <a:srgbClr val="000000"/>
               </a:solidFill>
@@ -1398,7 +1398,7 @@
         <p:spPr>
           <a:xfrm>
             <a:off x="540000" y="1260000"/>
-            <a:ext cx="8183880" cy="2284200"/>
+            <a:ext cx="8183520" cy="2284200"/>
           </a:xfrm>
           <a:prstGeom prst="rect">
             <a:avLst/>
@@ -1442,7 +1442,7 @@
               </a:rPr>
               <a:t>Software-Architektur sehr stark vom Framework (Django) vorgegeben</a:t>
             </a:r>
-            <a:endParaRPr b="0" lang="en-US" sz="2400" strike="noStrike" u="none">
+            <a:endParaRPr b="0" lang="de-DE" sz="2400" strike="noStrike" u="none">
               <a:solidFill>
                 <a:srgbClr val="000000"/>
               </a:solidFill>
@@ -1475,7 +1475,7 @@
               </a:rPr>
               <a:t>Domänenmodell zu Beginn erstellt, seitdem starke Orientierung daran</a:t>
             </a:r>
-            <a:endParaRPr b="0" lang="en-US" sz="2400" strike="noStrike" u="none">
+            <a:endParaRPr b="0" lang="de-DE" sz="2400" strike="noStrike" u="none">
               <a:solidFill>
                 <a:srgbClr val="000000"/>
               </a:solidFill>
@@ -1508,7 +1508,7 @@
               </a:rPr>
               <a:t>Auswahl von Architektur nach den persönlichen Erfahrungen mit dieser</a:t>
             </a:r>
-            <a:endParaRPr b="0" lang="en-US" sz="2400" strike="noStrike" u="none">
+            <a:endParaRPr b="0" lang="de-DE" sz="2400" strike="noStrike" u="none">
               <a:solidFill>
                 <a:srgbClr val="000000"/>
               </a:solidFill>
@@ -1561,8 +1561,8 @@
         </p:nvSpPr>
         <p:spPr>
           <a:xfrm>
-            <a:off x="504000" y="223560"/>
-            <a:ext cx="9069120" cy="948960"/>
+            <a:off x="504000" y="223200"/>
+            <a:ext cx="9068760" cy="949320"/>
           </a:xfrm>
           <a:prstGeom prst="rect">
             <a:avLst/>
@@ -1597,7 +1597,7 @@
               </a:rPr>
               <a:t>Entwurfs-Erstellung</a:t>
             </a:r>
-            <a:endParaRPr b="0" lang="en-US" sz="4400" strike="noStrike" u="none">
+            <a:endParaRPr b="0" lang="de-DE" sz="4400" strike="noStrike" u="none">
               <a:solidFill>
                 <a:srgbClr val="000000"/>
               </a:solidFill>
@@ -1621,7 +1621,7 @@
         <p:spPr>
           <a:xfrm>
             <a:off x="504000" y="1326600"/>
-            <a:ext cx="4894920" cy="4070880"/>
+            <a:ext cx="4894560" cy="4070520"/>
           </a:xfrm>
           <a:prstGeom prst="rect">
             <a:avLst/>
@@ -1657,7 +1657,7 @@
               </a:rPr>
               <a:t>Umsetzung der Entwurfsidee</a:t>
             </a:r>
-            <a:endParaRPr b="0" lang="en-US" sz="2400" strike="noStrike" u="none">
+            <a:endParaRPr b="0" lang="de-DE" sz="2400" strike="noStrike" u="none">
               <a:solidFill>
                 <a:srgbClr val="000000"/>
               </a:solidFill>
@@ -1692,7 +1692,7 @@
               </a:rPr>
               <a:t>Eric(=Architekt) erstellt Schnittstellen für Frontend-Backend</a:t>
             </a:r>
-            <a:endParaRPr b="0" lang="en-US" sz="2400" strike="noStrike" u="none">
+            <a:endParaRPr b="0" lang="de-DE" sz="2400" strike="noStrike" u="none">
               <a:solidFill>
                 <a:srgbClr val="000000"/>
               </a:solidFill>
@@ -1727,7 +1727,7 @@
               </a:rPr>
               <a:t>Anbindungen in spezifischer Datei zu finden</a:t>
             </a:r>
-            <a:endParaRPr b="0" lang="en-US" sz="2400" strike="noStrike" u="none">
+            <a:endParaRPr b="0" lang="de-DE" sz="2400" strike="noStrike" u="none">
               <a:solidFill>
                 <a:srgbClr val="000000"/>
               </a:solidFill>
@@ -1762,7 +1762,7 @@
               </a:rPr>
               <a:t>Frontend: Erstellung eines Wireframes(einzeln/gemeinsam) in Miro</a:t>
             </a:r>
-            <a:endParaRPr b="0" lang="en-US" sz="2400" strike="noStrike" u="none">
+            <a:endParaRPr b="0" lang="de-DE" sz="2400" strike="noStrike" u="none">
               <a:solidFill>
                 <a:srgbClr val="000000"/>
               </a:solidFill>
@@ -1786,7 +1786,7 @@
         <p:spPr>
           <a:xfrm>
             <a:off x="5901480" y="1172520"/>
-            <a:ext cx="3637440" cy="2347560"/>
+            <a:ext cx="3637080" cy="2347200"/>
           </a:xfrm>
           <a:prstGeom prst="rect">
             <a:avLst/>
@@ -1839,8 +1839,8 @@
         </p:nvSpPr>
         <p:spPr>
           <a:xfrm>
-            <a:off x="504000" y="223560"/>
-            <a:ext cx="9069120" cy="948960"/>
+            <a:off x="504000" y="223200"/>
+            <a:ext cx="9068760" cy="949320"/>
           </a:xfrm>
           <a:prstGeom prst="rect">
             <a:avLst/>
@@ -1873,9 +1873,9 @@
                 <a:uFillTx/>
                 <a:latin typeface="Arial"/>
               </a:rPr>
-              <a:t>Schwierigkeiten</a:t>
-            </a:r>
-            <a:endParaRPr b="0" lang="en-US" sz="4400" strike="noStrike" u="none">
+              <a:t>Beispiel-Modelle/-Sichten</a:t>
+            </a:r>
+            <a:endParaRPr b="0" lang="de-DE" sz="4400" strike="noStrike" u="none">
               <a:solidFill>
                 <a:srgbClr val="000000"/>
               </a:solidFill>
@@ -1886,20 +1886,20 @@
           </a:p>
         </p:txBody>
       </p:sp>
-      <p:sp>
-        <p:nvSpPr>
-          <p:cNvPr id="17" name="PlaceHolder 2"/>
-          <p:cNvSpPr>
-            <a:spLocks noGrp="1"/>
-          </p:cNvSpPr>
-          <p:nvPr>
-            <p:ph/>
-          </p:nvPr>
-        </p:nvSpPr>
+      <p:pic>
+        <p:nvPicPr>
+          <p:cNvPr id="17" name="" descr=""/>
+          <p:cNvPicPr/>
+          <p:nvPr/>
+        </p:nvPicPr>
+        <p:blipFill>
+          <a:blip r:embed="rId1"/>
+          <a:stretch/>
+        </p:blipFill>
         <p:spPr>
           <a:xfrm>
-            <a:off x="504000" y="1172520"/>
-            <a:ext cx="9069120" cy="3439800"/>
+            <a:off x="2057400" y="3657600"/>
+            <a:ext cx="5857560" cy="1861920"/>
           </a:xfrm>
           <a:prstGeom prst="rect">
             <a:avLst/>
@@ -1909,290 +1909,55 @@
             <a:noFill/>
           </a:ln>
         </p:spPr>
-        <p:txBody>
-          <a:bodyPr lIns="0" rIns="0" tIns="0" bIns="0" anchor="t">
-            <a:normAutofit fontScale="92500" lnSpcReduction="9999"/>
-          </a:bodyPr>
-          <a:p>
-            <a:pPr marL="432000" indent="0">
-              <a:lnSpc>
-                <a:spcPct val="100000"/>
-              </a:lnSpc>
-              <a:spcBef>
-                <a:spcPts val="1417"/>
-              </a:spcBef>
-              <a:buNone/>
-            </a:pPr>
-            <a:endParaRPr b="0" lang="en-US" sz="2800" strike="noStrike" u="none">
-              <a:solidFill>
-                <a:srgbClr val="000000"/>
-              </a:solidFill>
-              <a:effectLst/>
-              <a:uFillTx/>
-              <a:latin typeface="Arial"/>
-            </a:endParaRPr>
-          </a:p>
-          <a:p>
-            <a:pPr marL="432000" indent="-324000">
-              <a:lnSpc>
-                <a:spcPct val="100000"/>
-              </a:lnSpc>
-              <a:spcBef>
-                <a:spcPts val="1417"/>
-              </a:spcBef>
-              <a:buClr>
-                <a:srgbClr val="000000"/>
-              </a:buClr>
-              <a:buSzPct val="45000"/>
-              <a:buFont typeface="Wingdings" charset="2"/>
-              <a:buChar char=""/>
-            </a:pPr>
-            <a:r>
-              <a:rPr b="0" lang="de-DE" sz="2800" strike="noStrike" u="none">
-                <a:solidFill>
-                  <a:srgbClr val="000000"/>
-                </a:solidFill>
-                <a:effectLst/>
-                <a:uFillTx/>
-                <a:latin typeface="Arial"/>
-              </a:rPr>
-              <a:t>Teilw fehlen bei Implementierung einer Funktion noch Schnittstellen</a:t>
-            </a:r>
-            <a:endParaRPr b="0" lang="en-US" sz="2800" strike="noStrike" u="none">
-              <a:solidFill>
-                <a:srgbClr val="000000"/>
-              </a:solidFill>
-              <a:effectLst/>
-              <a:uFillTx/>
-              <a:latin typeface="Arial"/>
-            </a:endParaRPr>
-          </a:p>
-          <a:p>
-            <a:pPr lvl="1" marL="864000" indent="-324000">
-              <a:lnSpc>
-                <a:spcPct val="100000"/>
-              </a:lnSpc>
-              <a:spcBef>
-                <a:spcPts val="1134"/>
-              </a:spcBef>
-              <a:buClr>
-                <a:srgbClr val="000000"/>
-              </a:buClr>
-              <a:buSzPct val="75000"/>
-              <a:buFont typeface="Symbol" charset="2"/>
-              <a:buChar char=""/>
-            </a:pPr>
-            <a:r>
-              <a:rPr b="0" lang="de-DE" sz="2800" strike="noStrike" u="none">
-                <a:solidFill>
-                  <a:srgbClr val="000000"/>
-                </a:solidFill>
-                <a:effectLst/>
-                <a:uFillTx/>
-                <a:latin typeface="Arial"/>
-              </a:rPr>
-              <a:t>Müssen im nachhinein noch hinzugefügt werden</a:t>
-            </a:r>
-            <a:endParaRPr b="0" lang="en-US" sz="2800" strike="noStrike" u="none">
-              <a:solidFill>
-                <a:srgbClr val="000000"/>
-              </a:solidFill>
-              <a:effectLst/>
-              <a:uFillTx/>
-              <a:latin typeface="Arial"/>
-            </a:endParaRPr>
-          </a:p>
-          <a:p>
-            <a:pPr marL="432000" indent="-324000">
-              <a:lnSpc>
-                <a:spcPct val="100000"/>
-              </a:lnSpc>
-              <a:spcBef>
-                <a:spcPts val="1417"/>
-              </a:spcBef>
-              <a:buClr>
-                <a:srgbClr val="000000"/>
-              </a:buClr>
-              <a:buSzPct val="45000"/>
-              <a:buFont typeface="Wingdings" charset="2"/>
-              <a:buChar char=""/>
-            </a:pPr>
-            <a:r>
-              <a:rPr b="0" lang="de-DE" sz="2800" strike="noStrike" u="none">
-                <a:solidFill>
-                  <a:srgbClr val="000000"/>
-                </a:solidFill>
-                <a:effectLst/>
-                <a:uFillTx/>
-                <a:latin typeface="Arial"/>
-              </a:rPr>
-              <a:t>Reinfindung in Aufbau von Django-Projekt</a:t>
-            </a:r>
-            <a:endParaRPr b="0" lang="en-US" sz="2800" strike="noStrike" u="none">
-              <a:solidFill>
-                <a:srgbClr val="000000"/>
-              </a:solidFill>
-              <a:effectLst/>
-              <a:uFillTx/>
-              <a:latin typeface="Arial"/>
-            </a:endParaRPr>
-          </a:p>
-          <a:p>
-            <a:pPr lvl="1" marL="864000" indent="-324000">
-              <a:lnSpc>
-                <a:spcPct val="100000"/>
-              </a:lnSpc>
-              <a:spcBef>
-                <a:spcPts val="1134"/>
-              </a:spcBef>
-              <a:buClr>
-                <a:srgbClr val="000000"/>
-              </a:buClr>
-              <a:buSzPct val="75000"/>
-              <a:buFont typeface="Symbol" charset="2"/>
-              <a:buChar char=""/>
-            </a:pPr>
-            <a:r>
-              <a:rPr b="0" lang="de-DE" sz="2800" strike="noStrike" u="none">
-                <a:solidFill>
-                  <a:srgbClr val="000000"/>
-                </a:solidFill>
-                <a:effectLst/>
-                <a:uFillTx/>
-                <a:latin typeface="Arial"/>
-              </a:rPr>
-              <a:t>Viele kleine Dateien</a:t>
-            </a:r>
-            <a:endParaRPr b="0" lang="en-US" sz="2800" strike="noStrike" u="none">
-              <a:solidFill>
-                <a:srgbClr val="000000"/>
-              </a:solidFill>
-              <a:effectLst/>
-              <a:uFillTx/>
-              <a:latin typeface="Arial"/>
-            </a:endParaRPr>
-          </a:p>
-          <a:p>
-            <a:pPr marL="432000" indent="-324000">
-              <a:lnSpc>
-                <a:spcPct val="100000"/>
-              </a:lnSpc>
-              <a:spcBef>
-                <a:spcPts val="1417"/>
-              </a:spcBef>
-              <a:buClr>
-                <a:srgbClr val="000000"/>
-              </a:buClr>
-              <a:buSzPct val="45000"/>
-              <a:buFont typeface="Wingdings" charset="2"/>
-              <a:buChar char=""/>
-            </a:pPr>
-            <a:r>
-              <a:rPr b="0" lang="de-DE" sz="2800" strike="noStrike" u="none">
-                <a:solidFill>
-                  <a:srgbClr val="000000"/>
-                </a:solidFill>
-                <a:effectLst/>
-                <a:uFillTx/>
-                <a:latin typeface="Arial"/>
-              </a:rPr>
-              <a:t>Dokumentation der Schnittstellen</a:t>
-            </a:r>
-            <a:endParaRPr b="0" lang="en-US" sz="2800" strike="noStrike" u="none">
-              <a:solidFill>
-                <a:srgbClr val="000000"/>
-              </a:solidFill>
-              <a:effectLst/>
-              <a:uFillTx/>
-              <a:latin typeface="Arial"/>
-            </a:endParaRPr>
-          </a:p>
-          <a:p>
-            <a:pPr marL="432000" indent="0">
-              <a:lnSpc>
-                <a:spcPct val="100000"/>
-              </a:lnSpc>
-              <a:spcBef>
-                <a:spcPts val="1417"/>
-              </a:spcBef>
-              <a:buNone/>
-              <a:tabLst>
-                <a:tab algn="l" pos="0"/>
-              </a:tabLst>
-            </a:pPr>
-            <a:endParaRPr b="0" lang="en-US" sz="3200" strike="noStrike" u="none">
-              <a:solidFill>
-                <a:srgbClr val="000000"/>
-              </a:solidFill>
-              <a:effectLst/>
-              <a:uFillTx/>
-              <a:latin typeface="Arial"/>
-            </a:endParaRPr>
-          </a:p>
-        </p:txBody>
-      </p:sp>
-      <p:sp>
-        <p:nvSpPr>
-          <p:cNvPr id="18" name=""/>
-          <p:cNvSpPr/>
+      </p:pic>
+      <p:pic>
+        <p:nvPicPr>
+          <p:cNvPr id="18" name="" descr=""/>
+          <p:cNvPicPr/>
           <p:nvPr/>
-        </p:nvSpPr>
+        </p:nvPicPr>
+        <p:blipFill>
+          <a:blip r:embed="rId2"/>
+          <a:stretch/>
+        </p:blipFill>
         <p:spPr>
           <a:xfrm>
-            <a:off x="5040000" y="5040000"/>
-            <a:ext cx="4678560" cy="358560"/>
+            <a:off x="180000" y="1143000"/>
+            <a:ext cx="4848480" cy="3129480"/>
           </a:xfrm>
-          <a:prstGeom prst="roundRect">
-            <a:avLst>
-              <a:gd name="adj" fmla="val 16667"/>
-            </a:avLst>
+          <a:prstGeom prst="rect">
+            <a:avLst/>
           </a:prstGeom>
           <a:noFill/>
           <a:ln w="0">
-            <a:solidFill>
-              <a:srgbClr val="cccccc"/>
-            </a:solidFill>
+            <a:noFill/>
           </a:ln>
         </p:spPr>
-        <p:style>
-          <a:lnRef idx="0"/>
-          <a:fillRef idx="0"/>
-          <a:effectRef idx="0"/>
-          <a:fontRef idx="minor"/>
-        </p:style>
-        <p:txBody>
-          <a:bodyPr wrap="none" lIns="0" rIns="0" tIns="0" bIns="0" anchor="ctr">
-            <a:noAutofit/>
-          </a:bodyPr>
-          <a:p>
-            <a:pPr algn="ctr">
-              <a:lnSpc>
-                <a:spcPct val="100000"/>
-              </a:lnSpc>
-            </a:pPr>
-            <a:r>
-              <a:rPr b="0" lang="de-DE" sz="800" strike="noStrike" u="none">
-                <a:solidFill>
-                  <a:srgbClr val="000000"/>
-                </a:solidFill>
-                <a:effectLst/>
-                <a:uFillTx/>
-                <a:latin typeface="Noto Sans"/>
-                <a:ea typeface="DejaVu Sans"/>
-              </a:rPr>
-              <a:t>Miro-Board: https://miro.com/app/board/uXjVICkDR1A=/</a:t>
-            </a:r>
-            <a:endParaRPr b="0" lang="en-US" sz="800" strike="noStrike" u="none">
-              <a:solidFill>
-                <a:srgbClr val="000000"/>
-              </a:solidFill>
-              <a:effectLst/>
-              <a:uFillTx/>
-              <a:latin typeface="Arial"/>
-            </a:endParaRPr>
-          </a:p>
-        </p:txBody>
-      </p:sp>
+      </p:pic>
+      <p:pic>
+        <p:nvPicPr>
+          <p:cNvPr id="19" name="" descr=""/>
+          <p:cNvPicPr/>
+          <p:nvPr/>
+        </p:nvPicPr>
+        <p:blipFill>
+          <a:blip r:embed="rId3"/>
+          <a:stretch/>
+        </p:blipFill>
+        <p:spPr>
+          <a:xfrm>
+            <a:off x="8001000" y="1125720"/>
+            <a:ext cx="1828440" cy="3878280"/>
+          </a:xfrm>
+          <a:prstGeom prst="rect">
+            <a:avLst/>
+          </a:prstGeom>
+          <a:noFill/>
+          <a:ln w="0">
+            <a:noFill/>
+          </a:ln>
+        </p:spPr>
+      </p:pic>
     </p:spTree>
   </p:cSld>
   <mc:AlternateContent>
@@ -2225,7 +1990,7 @@
       </p:grpSpPr>
       <p:sp>
         <p:nvSpPr>
-          <p:cNvPr id="19" name="PlaceHolder 1"/>
+          <p:cNvPr id="20" name="PlaceHolder 1"/>
           <p:cNvSpPr>
             <a:spLocks noGrp="1"/>
           </p:cNvSpPr>
@@ -2235,8 +2000,8 @@
         </p:nvSpPr>
         <p:spPr>
           <a:xfrm>
-            <a:off x="504000" y="223560"/>
-            <a:ext cx="9069120" cy="948960"/>
+            <a:off x="504000" y="223200"/>
+            <a:ext cx="9068760" cy="949320"/>
           </a:xfrm>
           <a:prstGeom prst="rect">
             <a:avLst/>
@@ -2269,9 +2034,9 @@
                 <a:uFillTx/>
                 <a:latin typeface="Arial"/>
               </a:rPr>
-              <a:t>Beispiel-Modelle/-Sichten</a:t>
-            </a:r>
-            <a:endParaRPr b="0" lang="en-US" sz="4400" strike="noStrike" u="none">
+              <a:t>Bewertung und Auswahl von Ideen</a:t>
+            </a:r>
+            <a:endParaRPr b="0" lang="de-DE" sz="4400" strike="noStrike" u="none">
               <a:solidFill>
                 <a:srgbClr val="000000"/>
               </a:solidFill>
@@ -2282,20 +2047,20 @@
           </a:p>
         </p:txBody>
       </p:sp>
-      <p:pic>
-        <p:nvPicPr>
-          <p:cNvPr id="20" name="" descr=""/>
-          <p:cNvPicPr/>
-          <p:nvPr/>
-        </p:nvPicPr>
-        <p:blipFill>
-          <a:blip r:embed="rId1"/>
-          <a:stretch/>
-        </p:blipFill>
+      <p:sp>
+        <p:nvSpPr>
+          <p:cNvPr id="21" name="PlaceHolder 2"/>
+          <p:cNvSpPr>
+            <a:spLocks noGrp="1"/>
+          </p:cNvSpPr>
+          <p:nvPr>
+            <p:ph/>
+          </p:nvPr>
+        </p:nvSpPr>
         <p:spPr>
           <a:xfrm>
-            <a:off x="2057400" y="3657600"/>
-            <a:ext cx="5857920" cy="1862280"/>
+            <a:off x="504000" y="1326600"/>
+            <a:ext cx="9068760" cy="4070520"/>
           </a:xfrm>
           <a:prstGeom prst="rect">
             <a:avLst/>
@@ -2305,55 +2070,115 @@
             <a:noFill/>
           </a:ln>
         </p:spPr>
-      </p:pic>
-      <p:pic>
-        <p:nvPicPr>
-          <p:cNvPr id="21" name="" descr=""/>
-          <p:cNvPicPr/>
-          <p:nvPr/>
-        </p:nvPicPr>
-        <p:blipFill>
-          <a:blip r:embed="rId2"/>
-          <a:stretch/>
-        </p:blipFill>
-        <p:spPr>
-          <a:xfrm>
-            <a:off x="180000" y="1143000"/>
-            <a:ext cx="4848840" cy="3129840"/>
-          </a:xfrm>
-          <a:prstGeom prst="rect">
-            <a:avLst/>
-          </a:prstGeom>
-          <a:noFill/>
-          <a:ln w="0">
-            <a:noFill/>
-          </a:ln>
-        </p:spPr>
-      </p:pic>
-      <p:pic>
-        <p:nvPicPr>
-          <p:cNvPr id="22" name="" descr=""/>
-          <p:cNvPicPr/>
-          <p:nvPr/>
-        </p:nvPicPr>
-        <p:blipFill>
-          <a:blip r:embed="rId3"/>
-          <a:stretch/>
-        </p:blipFill>
-        <p:spPr>
-          <a:xfrm>
-            <a:off x="8001000" y="1125720"/>
-            <a:ext cx="1828800" cy="3878640"/>
-          </a:xfrm>
-          <a:prstGeom prst="rect">
-            <a:avLst/>
-          </a:prstGeom>
-          <a:noFill/>
-          <a:ln w="0">
-            <a:noFill/>
-          </a:ln>
-        </p:spPr>
-      </p:pic>
+        <p:txBody>
+          <a:bodyPr lIns="0" rIns="0" tIns="0" bIns="0" anchor="t">
+            <a:normAutofit/>
+          </a:bodyPr>
+          <a:p>
+            <a:pPr marL="432000" indent="-324000">
+              <a:lnSpc>
+                <a:spcPct val="100000"/>
+              </a:lnSpc>
+              <a:spcBef>
+                <a:spcPts val="1417"/>
+              </a:spcBef>
+              <a:buClr>
+                <a:srgbClr val="000000"/>
+              </a:buClr>
+              <a:buSzPct val="45000"/>
+              <a:buFont typeface="Wingdings" charset="2"/>
+              <a:buChar char=""/>
+            </a:pPr>
+            <a:r>
+              <a:rPr b="0" lang="de-DE" sz="3200" strike="noStrike" u="none">
+                <a:solidFill>
+                  <a:srgbClr val="000000"/>
+                </a:solidFill>
+                <a:effectLst/>
+                <a:uFillTx/>
+                <a:latin typeface="Arial"/>
+              </a:rPr>
+              <a:t>Beschreibung von neuen Ideen im Miro-Board</a:t>
+            </a:r>
+            <a:endParaRPr b="0" lang="de-DE" sz="3200" strike="noStrike" u="none">
+              <a:solidFill>
+                <a:srgbClr val="000000"/>
+              </a:solidFill>
+              <a:effectLst/>
+              <a:uFillTx/>
+              <a:latin typeface="Arial"/>
+            </a:endParaRPr>
+          </a:p>
+          <a:p>
+            <a:pPr marL="432000" indent="-324000">
+              <a:lnSpc>
+                <a:spcPct val="100000"/>
+              </a:lnSpc>
+              <a:spcBef>
+                <a:spcPts val="1417"/>
+              </a:spcBef>
+              <a:buClr>
+                <a:srgbClr val="000000"/>
+              </a:buClr>
+              <a:buSzPct val="45000"/>
+              <a:buFont typeface="Wingdings" charset="2"/>
+              <a:buChar char=""/>
+            </a:pPr>
+            <a:r>
+              <a:rPr b="0" lang="de-DE" sz="3200" strike="noStrike" u="none">
+                <a:solidFill>
+                  <a:srgbClr val="000000"/>
+                </a:solidFill>
+                <a:effectLst/>
+                <a:uFillTx/>
+                <a:latin typeface="Arial"/>
+              </a:rPr>
+              <a:t>Werden im Weekly besprochen, Diskussion über Auswahl/Verbesserungsmöglichkeiten</a:t>
+            </a:r>
+            <a:endParaRPr b="0" lang="de-DE" sz="3200" strike="noStrike" u="none">
+              <a:solidFill>
+                <a:srgbClr val="000000"/>
+              </a:solidFill>
+              <a:effectLst/>
+              <a:uFillTx/>
+              <a:latin typeface="Arial"/>
+            </a:endParaRPr>
+          </a:p>
+          <a:p>
+            <a:pPr marL="864000" indent="0">
+              <a:lnSpc>
+                <a:spcPct val="100000"/>
+              </a:lnSpc>
+              <a:spcBef>
+                <a:spcPts val="1134"/>
+              </a:spcBef>
+              <a:buNone/>
+              <a:tabLst>
+                <a:tab algn="l" pos="0"/>
+              </a:tabLst>
+            </a:pPr>
+            <a:r>
+              <a:rPr b="0" lang="de-DE" sz="2800" strike="noStrike" u="none">
+                <a:solidFill>
+                  <a:srgbClr val="000000"/>
+                </a:solidFill>
+                <a:effectLst/>
+                <a:uFillTx/>
+                <a:latin typeface="Arial"/>
+              </a:rPr>
+              <a:t> </a:t>
+            </a:r>
+            <a:endParaRPr b="0" lang="de-DE" sz="2800" strike="noStrike" u="none">
+              <a:solidFill>
+                <a:srgbClr val="000000"/>
+              </a:solidFill>
+              <a:effectLst/>
+              <a:uFillTx/>
+              <a:latin typeface="Arial"/>
+            </a:endParaRPr>
+          </a:p>
+        </p:txBody>
+      </p:sp>
     </p:spTree>
   </p:cSld>
   <mc:AlternateContent>
@@ -2386,7 +2211,7 @@
       </p:grpSpPr>
       <p:sp>
         <p:nvSpPr>
-          <p:cNvPr id="23" name="PlaceHolder 1"/>
+          <p:cNvPr id="22" name="PlaceHolder 1"/>
           <p:cNvSpPr>
             <a:spLocks noGrp="1"/>
           </p:cNvSpPr>
@@ -2396,8 +2221,8 @@
         </p:nvSpPr>
         <p:spPr>
           <a:xfrm>
-            <a:off x="504000" y="223560"/>
-            <a:ext cx="9069120" cy="948960"/>
+            <a:off x="504000" y="223200"/>
+            <a:ext cx="9068760" cy="949320"/>
           </a:xfrm>
           <a:prstGeom prst="rect">
             <a:avLst/>
@@ -2430,9 +2255,9 @@
                 <a:uFillTx/>
                 <a:latin typeface="Arial"/>
               </a:rPr>
-              <a:t>Bewertung und Auswahl von Ideen</a:t>
-            </a:r>
-            <a:endParaRPr b="0" lang="en-US" sz="4400" strike="noStrike" u="none">
+              <a:t>Schwierigkeiten</a:t>
+            </a:r>
+            <a:endParaRPr b="0" lang="de-DE" sz="4400" strike="noStrike" u="none">
               <a:solidFill>
                 <a:srgbClr val="000000"/>
               </a:solidFill>
@@ -2445,7 +2270,7 @@
       </p:sp>
       <p:sp>
         <p:nvSpPr>
-          <p:cNvPr id="24" name="PlaceHolder 2"/>
+          <p:cNvPr id="23" name="PlaceHolder 2"/>
           <p:cNvSpPr>
             <a:spLocks noGrp="1"/>
           </p:cNvSpPr>
@@ -2455,8 +2280,8 @@
         </p:nvSpPr>
         <p:spPr>
           <a:xfrm>
-            <a:off x="504000" y="1326600"/>
-            <a:ext cx="9069120" cy="4070880"/>
+            <a:off x="504000" y="1172520"/>
+            <a:ext cx="9068760" cy="3439440"/>
           </a:xfrm>
           <a:prstGeom prst="rect">
             <a:avLst/>
@@ -2468,91 +2293,48 @@
         </p:spPr>
         <p:txBody>
           <a:bodyPr lIns="0" rIns="0" tIns="0" bIns="0" anchor="t">
-            <a:normAutofit/>
+            <a:normAutofit fontScale="92500" lnSpcReduction="9999"/>
           </a:bodyPr>
           <a:p>
-            <a:pPr marL="432000" indent="-324000">
+            <a:pPr marL="432000" indent="0">
               <a:lnSpc>
                 <a:spcPct val="100000"/>
               </a:lnSpc>
               <a:spcBef>
                 <a:spcPts val="1417"/>
-              </a:spcBef>
-              <a:buClr>
-                <a:srgbClr val="000000"/>
-              </a:buClr>
-              <a:buSzPct val="45000"/>
-              <a:buFont typeface="Wingdings" charset="2"/>
-              <a:buChar char=""/>
-            </a:pPr>
-            <a:r>
-              <a:rPr b="0" lang="de-DE" sz="3200" strike="noStrike" u="none">
-                <a:solidFill>
-                  <a:srgbClr val="000000"/>
-                </a:solidFill>
-                <a:effectLst/>
-                <a:uFillTx/>
-                <a:latin typeface="Arial"/>
-              </a:rPr>
-              <a:t>Beschreibung von neuen Ideen im Miro-Board</a:t>
-            </a:r>
-            <a:endParaRPr b="0" lang="en-US" sz="3200" strike="noStrike" u="none">
-              <a:solidFill>
-                <a:srgbClr val="000000"/>
-              </a:solidFill>
-              <a:effectLst/>
-              <a:uFillTx/>
-              <a:latin typeface="Arial"/>
-            </a:endParaRPr>
-          </a:p>
-          <a:p>
-            <a:pPr marL="432000" indent="-324000">
-              <a:lnSpc>
-                <a:spcPct val="100000"/>
-              </a:lnSpc>
-              <a:spcBef>
-                <a:spcPts val="1417"/>
-              </a:spcBef>
-              <a:buClr>
-                <a:srgbClr val="000000"/>
-              </a:buClr>
-              <a:buSzPct val="45000"/>
-              <a:buFont typeface="Wingdings" charset="2"/>
-              <a:buChar char=""/>
-            </a:pPr>
-            <a:r>
-              <a:rPr b="0" lang="de-DE" sz="3200" strike="noStrike" u="none">
-                <a:solidFill>
-                  <a:srgbClr val="000000"/>
-                </a:solidFill>
-                <a:effectLst/>
-                <a:uFillTx/>
-                <a:latin typeface="Arial"/>
-              </a:rPr>
-              <a:t>Werden im Weekly besprochen, Diskussion über Auswahl/Verbesserungsmöglichkeiten</a:t>
-            </a:r>
-            <a:endParaRPr b="0" lang="en-US" sz="3200" strike="noStrike" u="none">
-              <a:solidFill>
-                <a:srgbClr val="000000"/>
-              </a:solidFill>
-              <a:effectLst/>
-              <a:uFillTx/>
-              <a:latin typeface="Arial"/>
-            </a:endParaRPr>
-          </a:p>
-          <a:p>
-            <a:pPr marL="864000" indent="0">
-              <a:lnSpc>
-                <a:spcPct val="100000"/>
-              </a:lnSpc>
-              <a:spcBef>
-                <a:spcPts val="1134"/>
               </a:spcBef>
               <a:buNone/>
               <a:tabLst>
                 <a:tab algn="l" pos="0"/>
               </a:tabLst>
             </a:pPr>
+            <a:endParaRPr b="0" lang="de-DE" sz="2800" strike="noStrike" u="none">
+              <a:solidFill>
+                <a:srgbClr val="000000"/>
+              </a:solidFill>
+              <a:effectLst/>
+              <a:uFillTx/>
+              <a:latin typeface="Arial"/>
+            </a:endParaRPr>
+          </a:p>
+          <a:p>
+            <a:pPr marL="432000" indent="-324000">
+              <a:lnSpc>
+                <a:spcPct val="100000"/>
+              </a:lnSpc>
+              <a:spcBef>
+                <a:spcPts val="1417"/>
+              </a:spcBef>
+              <a:buClr>
+                <a:srgbClr val="000000"/>
+              </a:buClr>
+              <a:buSzPct val="45000"/>
+              <a:buFont typeface="Wingdings" charset="2"/>
+              <a:buChar char=""/>
+              <a:tabLst>
+                <a:tab algn="l" pos="0"/>
+              </a:tabLst>
+            </a:pPr>
             <a:r>
               <a:rPr b="0" lang="de-DE" sz="2800" strike="noStrike" u="none">
                 <a:solidFill>
@@ -2562,9 +2344,245 @@
                 <a:uFillTx/>
                 <a:latin typeface="Arial"/>
               </a:rPr>
-              <a:t> </a:t>
-            </a:r>
-            <a:endParaRPr b="0" lang="en-US" sz="2800" strike="noStrike" u="none">
+              <a:t>Teilw fehlen bei Implementierung einer Funktion noch Schnittstellen</a:t>
+            </a:r>
+            <a:endParaRPr b="0" lang="de-DE" sz="2800" strike="noStrike" u="none">
+              <a:solidFill>
+                <a:srgbClr val="000000"/>
+              </a:solidFill>
+              <a:effectLst/>
+              <a:uFillTx/>
+              <a:latin typeface="Arial"/>
+            </a:endParaRPr>
+          </a:p>
+          <a:p>
+            <a:pPr lvl="1" marL="864000" indent="-324000">
+              <a:lnSpc>
+                <a:spcPct val="100000"/>
+              </a:lnSpc>
+              <a:spcBef>
+                <a:spcPts val="1134"/>
+              </a:spcBef>
+              <a:buClr>
+                <a:srgbClr val="000000"/>
+              </a:buClr>
+              <a:buSzPct val="75000"/>
+              <a:buFont typeface="Symbol" charset="2"/>
+              <a:buChar char=""/>
+              <a:tabLst>
+                <a:tab algn="l" pos="0"/>
+              </a:tabLst>
+            </a:pPr>
+            <a:r>
+              <a:rPr b="0" lang="de-DE" sz="2800" strike="noStrike" u="none">
+                <a:solidFill>
+                  <a:srgbClr val="000000"/>
+                </a:solidFill>
+                <a:effectLst/>
+                <a:uFillTx/>
+                <a:latin typeface="Arial"/>
+              </a:rPr>
+              <a:t>Müssen im nachhinein noch hinzugefügt werden</a:t>
+            </a:r>
+            <a:endParaRPr b="0" lang="de-DE" sz="2800" strike="noStrike" u="none">
+              <a:solidFill>
+                <a:srgbClr val="000000"/>
+              </a:solidFill>
+              <a:effectLst/>
+              <a:uFillTx/>
+              <a:latin typeface="Arial"/>
+            </a:endParaRPr>
+          </a:p>
+          <a:p>
+            <a:pPr marL="432000" indent="-324000">
+              <a:lnSpc>
+                <a:spcPct val="100000"/>
+              </a:lnSpc>
+              <a:spcBef>
+                <a:spcPts val="1417"/>
+              </a:spcBef>
+              <a:buClr>
+                <a:srgbClr val="000000"/>
+              </a:buClr>
+              <a:buSzPct val="45000"/>
+              <a:buFont typeface="Wingdings" charset="2"/>
+              <a:buChar char=""/>
+              <a:tabLst>
+                <a:tab algn="l" pos="0"/>
+              </a:tabLst>
+            </a:pPr>
+            <a:r>
+              <a:rPr b="0" lang="de-DE" sz="2800" strike="noStrike" u="none">
+                <a:solidFill>
+                  <a:srgbClr val="000000"/>
+                </a:solidFill>
+                <a:effectLst/>
+                <a:uFillTx/>
+                <a:latin typeface="Arial"/>
+              </a:rPr>
+              <a:t>Reinfindung in Aufbau von Django-Projekt</a:t>
+            </a:r>
+            <a:endParaRPr b="0" lang="de-DE" sz="2800" strike="noStrike" u="none">
+              <a:solidFill>
+                <a:srgbClr val="000000"/>
+              </a:solidFill>
+              <a:effectLst/>
+              <a:uFillTx/>
+              <a:latin typeface="Arial"/>
+            </a:endParaRPr>
+          </a:p>
+          <a:p>
+            <a:pPr lvl="1" marL="864000" indent="-324000">
+              <a:lnSpc>
+                <a:spcPct val="100000"/>
+              </a:lnSpc>
+              <a:spcBef>
+                <a:spcPts val="1134"/>
+              </a:spcBef>
+              <a:buClr>
+                <a:srgbClr val="000000"/>
+              </a:buClr>
+              <a:buSzPct val="75000"/>
+              <a:buFont typeface="Symbol" charset="2"/>
+              <a:buChar char=""/>
+              <a:tabLst>
+                <a:tab algn="l" pos="0"/>
+              </a:tabLst>
+            </a:pPr>
+            <a:r>
+              <a:rPr b="0" lang="de-DE" sz="2800" strike="noStrike" u="none">
+                <a:solidFill>
+                  <a:srgbClr val="000000"/>
+                </a:solidFill>
+                <a:effectLst/>
+                <a:uFillTx/>
+                <a:latin typeface="Arial"/>
+              </a:rPr>
+              <a:t>Viele kleine Dateien</a:t>
+            </a:r>
+            <a:endParaRPr b="0" lang="de-DE" sz="2800" strike="noStrike" u="none">
+              <a:solidFill>
+                <a:srgbClr val="000000"/>
+              </a:solidFill>
+              <a:effectLst/>
+              <a:uFillTx/>
+              <a:latin typeface="Arial"/>
+            </a:endParaRPr>
+          </a:p>
+          <a:p>
+            <a:pPr marL="432000" indent="-324000">
+              <a:lnSpc>
+                <a:spcPct val="100000"/>
+              </a:lnSpc>
+              <a:spcBef>
+                <a:spcPts val="1417"/>
+              </a:spcBef>
+              <a:buClr>
+                <a:srgbClr val="000000"/>
+              </a:buClr>
+              <a:buSzPct val="45000"/>
+              <a:buFont typeface="Wingdings" charset="2"/>
+              <a:buChar char=""/>
+              <a:tabLst>
+                <a:tab algn="l" pos="0"/>
+              </a:tabLst>
+            </a:pPr>
+            <a:r>
+              <a:rPr b="0" lang="de-DE" sz="2800" strike="noStrike" u="none">
+                <a:solidFill>
+                  <a:srgbClr val="000000"/>
+                </a:solidFill>
+                <a:effectLst/>
+                <a:uFillTx/>
+                <a:latin typeface="Arial"/>
+              </a:rPr>
+              <a:t>Dokumentation der Schnittstellen</a:t>
+            </a:r>
+            <a:endParaRPr b="0" lang="de-DE" sz="2800" strike="noStrike" u="none">
+              <a:solidFill>
+                <a:srgbClr val="000000"/>
+              </a:solidFill>
+              <a:effectLst/>
+              <a:uFillTx/>
+              <a:latin typeface="Arial"/>
+            </a:endParaRPr>
+          </a:p>
+          <a:p>
+            <a:pPr marL="432000" indent="0">
+              <a:lnSpc>
+                <a:spcPct val="100000"/>
+              </a:lnSpc>
+              <a:spcBef>
+                <a:spcPts val="1417"/>
+              </a:spcBef>
+              <a:buNone/>
+              <a:tabLst>
+                <a:tab algn="l" pos="0"/>
+              </a:tabLst>
+            </a:pPr>
+            <a:endParaRPr b="0" lang="de-DE" sz="3200" strike="noStrike" u="none">
+              <a:solidFill>
+                <a:srgbClr val="000000"/>
+              </a:solidFill>
+              <a:effectLst/>
+              <a:uFillTx/>
+              <a:latin typeface="Arial"/>
+            </a:endParaRPr>
+          </a:p>
+        </p:txBody>
+      </p:sp>
+      <p:sp>
+        <p:nvSpPr>
+          <p:cNvPr id="24" name=""/>
+          <p:cNvSpPr/>
+          <p:nvPr/>
+        </p:nvSpPr>
+        <p:spPr>
+          <a:xfrm>
+            <a:off x="5040000" y="5040000"/>
+            <a:ext cx="4678200" cy="358200"/>
+          </a:xfrm>
+          <a:prstGeom prst="roundRect">
+            <a:avLst>
+              <a:gd name="adj" fmla="val 16667"/>
+            </a:avLst>
+          </a:prstGeom>
+          <a:noFill/>
+          <a:ln w="0">
+            <a:solidFill>
+              <a:srgbClr val="cccccc"/>
+            </a:solidFill>
+          </a:ln>
+        </p:spPr>
+        <p:style>
+          <a:lnRef idx="0"/>
+          <a:fillRef idx="0"/>
+          <a:effectRef idx="0"/>
+          <a:fontRef idx="minor"/>
+        </p:style>
+        <p:txBody>
+          <a:bodyPr wrap="none" lIns="0" rIns="0" tIns="0" bIns="0" anchor="ctr">
+            <a:noAutofit/>
+          </a:bodyPr>
+          <a:p>
+            <a:pPr algn="ctr">
+              <a:lnSpc>
+                <a:spcPct val="100000"/>
+              </a:lnSpc>
+            </a:pPr>
+            <a:r>
+              <a:rPr b="0" lang="de-DE" sz="800" strike="noStrike" u="none">
+                <a:solidFill>
+                  <a:srgbClr val="000000"/>
+                </a:solidFill>
+                <a:effectLst/>
+                <a:uFillTx/>
+                <a:latin typeface="Noto Sans"/>
+                <a:ea typeface="DejaVu Sans"/>
+              </a:rPr>
+              <a:t>Miro-Board: https://miro.com/app/board/uXjVICkDR1A=/</a:t>
+            </a:r>
+            <a:endParaRPr b="0" lang="de-DE" sz="800" strike="noStrike" u="none">
               <a:solidFill>
                 <a:srgbClr val="000000"/>
               </a:solidFill>

</xml_diff>